<commit_message>
Correção apresentação e diagrama de classes
</commit_message>
<xml_diff>
--- a/Apresentação Wordin'On sem formatação.pptx
+++ b/Apresentação Wordin'On sem formatação.pptx
@@ -119,6 +119,11 @@
       </a:defRPr>
     </a:lvl9pPr>
   </p:defaultTextStyle>
+  <p:extLst>
+    <p:ext uri="{EFAFB233-063F-42B5-8137-9DF3F51BA10A}">
+      <p15:sldGuideLst xmlns:p15="http://schemas.microsoft.com/office/powerpoint/2012/main"/>
+    </p:ext>
+  </p:extLst>
 </p:presentation>
 </file>
 
@@ -253,7 +258,7 @@
           <a:p>
             <a:fld id="{60720A79-3C1D-492B-B942-69376B79967E}" type="datetimeFigureOut">
               <a:rPr lang="pt-BR" smtClean="0"/>
-              <a:t>24/06/2018</a:t>
+              <a:t>25/06/2018</a:t>
             </a:fld>
             <a:endParaRPr lang="pt-BR"/>
           </a:p>
@@ -423,7 +428,7 @@
           <a:p>
             <a:fld id="{60720A79-3C1D-492B-B942-69376B79967E}" type="datetimeFigureOut">
               <a:rPr lang="pt-BR" smtClean="0"/>
-              <a:t>24/06/2018</a:t>
+              <a:t>25/06/2018</a:t>
             </a:fld>
             <a:endParaRPr lang="pt-BR"/>
           </a:p>
@@ -603,7 +608,7 @@
           <a:p>
             <a:fld id="{60720A79-3C1D-492B-B942-69376B79967E}" type="datetimeFigureOut">
               <a:rPr lang="pt-BR" smtClean="0"/>
-              <a:t>24/06/2018</a:t>
+              <a:t>25/06/2018</a:t>
             </a:fld>
             <a:endParaRPr lang="pt-BR"/>
           </a:p>
@@ -773,7 +778,7 @@
           <a:p>
             <a:fld id="{60720A79-3C1D-492B-B942-69376B79967E}" type="datetimeFigureOut">
               <a:rPr lang="pt-BR" smtClean="0"/>
-              <a:t>24/06/2018</a:t>
+              <a:t>25/06/2018</a:t>
             </a:fld>
             <a:endParaRPr lang="pt-BR"/>
           </a:p>
@@ -1019,7 +1024,7 @@
           <a:p>
             <a:fld id="{60720A79-3C1D-492B-B942-69376B79967E}" type="datetimeFigureOut">
               <a:rPr lang="pt-BR" smtClean="0"/>
-              <a:t>24/06/2018</a:t>
+              <a:t>25/06/2018</a:t>
             </a:fld>
             <a:endParaRPr lang="pt-BR"/>
           </a:p>
@@ -1251,7 +1256,7 @@
           <a:p>
             <a:fld id="{60720A79-3C1D-492B-B942-69376B79967E}" type="datetimeFigureOut">
               <a:rPr lang="pt-BR" smtClean="0"/>
-              <a:t>24/06/2018</a:t>
+              <a:t>25/06/2018</a:t>
             </a:fld>
             <a:endParaRPr lang="pt-BR"/>
           </a:p>
@@ -1618,7 +1623,7 @@
           <a:p>
             <a:fld id="{60720A79-3C1D-492B-B942-69376B79967E}" type="datetimeFigureOut">
               <a:rPr lang="pt-BR" smtClean="0"/>
-              <a:t>24/06/2018</a:t>
+              <a:t>25/06/2018</a:t>
             </a:fld>
             <a:endParaRPr lang="pt-BR"/>
           </a:p>
@@ -1736,7 +1741,7 @@
           <a:p>
             <a:fld id="{60720A79-3C1D-492B-B942-69376B79967E}" type="datetimeFigureOut">
               <a:rPr lang="pt-BR" smtClean="0"/>
-              <a:t>24/06/2018</a:t>
+              <a:t>25/06/2018</a:t>
             </a:fld>
             <a:endParaRPr lang="pt-BR"/>
           </a:p>
@@ -1831,7 +1836,7 @@
           <a:p>
             <a:fld id="{60720A79-3C1D-492B-B942-69376B79967E}" type="datetimeFigureOut">
               <a:rPr lang="pt-BR" smtClean="0"/>
-              <a:t>24/06/2018</a:t>
+              <a:t>25/06/2018</a:t>
             </a:fld>
             <a:endParaRPr lang="pt-BR"/>
           </a:p>
@@ -2108,7 +2113,7 @@
           <a:p>
             <a:fld id="{60720A79-3C1D-492B-B942-69376B79967E}" type="datetimeFigureOut">
               <a:rPr lang="pt-BR" smtClean="0"/>
-              <a:t>24/06/2018</a:t>
+              <a:t>25/06/2018</a:t>
             </a:fld>
             <a:endParaRPr lang="pt-BR"/>
           </a:p>
@@ -2361,7 +2366,7 @@
           <a:p>
             <a:fld id="{60720A79-3C1D-492B-B942-69376B79967E}" type="datetimeFigureOut">
               <a:rPr lang="pt-BR" smtClean="0"/>
-              <a:t>24/06/2018</a:t>
+              <a:t>25/06/2018</a:t>
             </a:fld>
             <a:endParaRPr lang="pt-BR"/>
           </a:p>
@@ -2574,7 +2579,7 @@
           <a:p>
             <a:fld id="{60720A79-3C1D-492B-B942-69376B79967E}" type="datetimeFigureOut">
               <a:rPr lang="pt-BR" smtClean="0"/>
-              <a:t>24/06/2018</a:t>
+              <a:t>25/06/2018</a:t>
             </a:fld>
             <a:endParaRPr lang="pt-BR"/>
           </a:p>
@@ -3258,7 +3263,7 @@
       </p:grpSpPr>
       <p:pic>
         <p:nvPicPr>
-          <p:cNvPr id="3" name="Imagem 2"/>
+          <p:cNvPr id="2" name="Imagem 1"/>
           <p:cNvPicPr>
             <a:picLocks noChangeAspect="1"/>
           </p:cNvPicPr>
@@ -3273,7 +3278,7 @@
         <p:spPr>
           <a:xfrm>
             <a:off x="0" y="0"/>
-            <a:ext cx="12197953" cy="6858000"/>
+            <a:ext cx="12192000" cy="6858000"/>
           </a:xfrm>
           <a:prstGeom prst="rect">
             <a:avLst/>

</xml_diff>